<commit_message>
Migrated to Markdown page.
</commit_message>
<xml_diff>
--- a/human-se-logo.pptx
+++ b/human-se-logo.pptx
@@ -6,6 +6,7 @@
   </p:sldMasterIdLst>
   <p:sldIdLst>
     <p:sldId id="257" r:id="rId2"/>
+    <p:sldId id="258" r:id="rId3"/>
   </p:sldIdLst>
   <p:sldSz cx="12192000" cy="6858000"/>
   <p:notesSz cx="6858000" cy="9144000"/>
@@ -238,7 +239,7 @@
           <a:p>
             <a:fld id="{8044A842-A64A-7845-831F-0E2FF016D7FA}" type="datetimeFigureOut">
               <a:rPr lang="en-US" smtClean="0"/>
-              <a:t>9/2/16</a:t>
+              <a:t>12/16/2016</a:t>
             </a:fld>
             <a:endParaRPr lang="en-US"/>
           </a:p>
@@ -408,7 +409,7 @@
           <a:p>
             <a:fld id="{8044A842-A64A-7845-831F-0E2FF016D7FA}" type="datetimeFigureOut">
               <a:rPr lang="en-US" smtClean="0"/>
-              <a:t>9/2/16</a:t>
+              <a:t>12/16/2016</a:t>
             </a:fld>
             <a:endParaRPr lang="en-US"/>
           </a:p>
@@ -588,7 +589,7 @@
           <a:p>
             <a:fld id="{8044A842-A64A-7845-831F-0E2FF016D7FA}" type="datetimeFigureOut">
               <a:rPr lang="en-US" smtClean="0"/>
-              <a:t>9/2/16</a:t>
+              <a:t>12/16/2016</a:t>
             </a:fld>
             <a:endParaRPr lang="en-US"/>
           </a:p>
@@ -758,7 +759,7 @@
           <a:p>
             <a:fld id="{8044A842-A64A-7845-831F-0E2FF016D7FA}" type="datetimeFigureOut">
               <a:rPr lang="en-US" smtClean="0"/>
-              <a:t>9/2/16</a:t>
+              <a:t>12/16/2016</a:t>
             </a:fld>
             <a:endParaRPr lang="en-US"/>
           </a:p>
@@ -1004,7 +1005,7 @@
           <a:p>
             <a:fld id="{8044A842-A64A-7845-831F-0E2FF016D7FA}" type="datetimeFigureOut">
               <a:rPr lang="en-US" smtClean="0"/>
-              <a:t>9/2/16</a:t>
+              <a:t>12/16/2016</a:t>
             </a:fld>
             <a:endParaRPr lang="en-US"/>
           </a:p>
@@ -1236,7 +1237,7 @@
           <a:p>
             <a:fld id="{8044A842-A64A-7845-831F-0E2FF016D7FA}" type="datetimeFigureOut">
               <a:rPr lang="en-US" smtClean="0"/>
-              <a:t>9/2/16</a:t>
+              <a:t>12/16/2016</a:t>
             </a:fld>
             <a:endParaRPr lang="en-US"/>
           </a:p>
@@ -1603,7 +1604,7 @@
           <a:p>
             <a:fld id="{8044A842-A64A-7845-831F-0E2FF016D7FA}" type="datetimeFigureOut">
               <a:rPr lang="en-US" smtClean="0"/>
-              <a:t>9/2/16</a:t>
+              <a:t>12/16/2016</a:t>
             </a:fld>
             <a:endParaRPr lang="en-US"/>
           </a:p>
@@ -1721,7 +1722,7 @@
           <a:p>
             <a:fld id="{8044A842-A64A-7845-831F-0E2FF016D7FA}" type="datetimeFigureOut">
               <a:rPr lang="en-US" smtClean="0"/>
-              <a:t>9/2/16</a:t>
+              <a:t>12/16/2016</a:t>
             </a:fld>
             <a:endParaRPr lang="en-US"/>
           </a:p>
@@ -1816,7 +1817,7 @@
           <a:p>
             <a:fld id="{8044A842-A64A-7845-831F-0E2FF016D7FA}" type="datetimeFigureOut">
               <a:rPr lang="en-US" smtClean="0"/>
-              <a:t>9/2/16</a:t>
+              <a:t>12/16/2016</a:t>
             </a:fld>
             <a:endParaRPr lang="en-US"/>
           </a:p>
@@ -2093,7 +2094,7 @@
           <a:p>
             <a:fld id="{8044A842-A64A-7845-831F-0E2FF016D7FA}" type="datetimeFigureOut">
               <a:rPr lang="en-US" smtClean="0"/>
-              <a:t>9/2/16</a:t>
+              <a:t>12/16/2016</a:t>
             </a:fld>
             <a:endParaRPr lang="en-US"/>
           </a:p>
@@ -2346,7 +2347,7 @@
           <a:p>
             <a:fld id="{8044A842-A64A-7845-831F-0E2FF016D7FA}" type="datetimeFigureOut">
               <a:rPr lang="en-US" smtClean="0"/>
-              <a:t>9/2/16</a:t>
+              <a:t>12/16/2016</a:t>
             </a:fld>
             <a:endParaRPr lang="en-US"/>
           </a:p>
@@ -2559,7 +2560,7 @@
           <a:p>
             <a:fld id="{8044A842-A64A-7845-831F-0E2FF016D7FA}" type="datetimeFigureOut">
               <a:rPr lang="en-US" smtClean="0"/>
-              <a:t>9/2/16</a:t>
+              <a:t>12/16/2016</a:t>
             </a:fld>
             <a:endParaRPr lang="en-US"/>
           </a:p>
@@ -3587,6 +3588,706 @@
 </p:sld>
 </file>
 
+<file path=ppt/slides/slide2.xml><?xml version="1.0" encoding="utf-8"?>
+<p:sld xmlns:a="http://schemas.openxmlformats.org/drawingml/2006/main" xmlns:r="http://schemas.openxmlformats.org/officeDocument/2006/relationships" xmlns:p="http://schemas.openxmlformats.org/presentationml/2006/main">
+  <p:cSld>
+    <p:spTree>
+      <p:nvGrpSpPr>
+        <p:cNvPr id="1" name=""/>
+        <p:cNvGrpSpPr/>
+        <p:nvPr/>
+      </p:nvGrpSpPr>
+      <p:grpSpPr>
+        <a:xfrm>
+          <a:off x="0" y="0"/>
+          <a:ext cx="0" cy="0"/>
+          <a:chOff x="0" y="0"/>
+          <a:chExt cx="0" cy="0"/>
+        </a:xfrm>
+      </p:grpSpPr>
+      <p:grpSp>
+        <p:nvGrpSpPr>
+          <p:cNvPr id="4" name="Group 3"/>
+          <p:cNvGrpSpPr/>
+          <p:nvPr/>
+        </p:nvGrpSpPr>
+        <p:grpSpPr>
+          <a:xfrm>
+            <a:off x="447113" y="1016223"/>
+            <a:ext cx="9712025" cy="3200400"/>
+            <a:chOff x="447113" y="1016223"/>
+            <a:chExt cx="9712025" cy="3200400"/>
+          </a:xfrm>
+        </p:grpSpPr>
+        <p:sp>
+          <p:nvSpPr>
+            <p:cNvPr id="2" name="Oval 2"/>
+            <p:cNvSpPr/>
+            <p:nvPr/>
+          </p:nvSpPr>
+          <p:spPr>
+            <a:xfrm>
+              <a:off x="447113" y="1016223"/>
+              <a:ext cx="3202738" cy="3200400"/>
+            </a:xfrm>
+            <a:custGeom>
+              <a:avLst/>
+              <a:gdLst/>
+              <a:ahLst/>
+              <a:cxnLst/>
+              <a:rect l="l" t="t" r="r" b="b"/>
+              <a:pathLst>
+                <a:path w="7765679" h="7765679">
+                  <a:moveTo>
+                    <a:pt x="1913047" y="2108862"/>
+                  </a:moveTo>
+                  <a:cubicBezTo>
+                    <a:pt x="1808506" y="2113082"/>
+                    <a:pt x="1711626" y="2178582"/>
+                    <a:pt x="1672471" y="2282670"/>
+                  </a:cubicBezTo>
+                  <a:cubicBezTo>
+                    <a:pt x="1620264" y="2421453"/>
+                    <a:pt x="1690448" y="2576281"/>
+                    <a:pt x="1829232" y="2628488"/>
+                  </a:cubicBezTo>
+                  <a:lnTo>
+                    <a:pt x="3262692" y="3167719"/>
+                  </a:lnTo>
+                  <a:lnTo>
+                    <a:pt x="3261187" y="3182647"/>
+                  </a:lnTo>
+                  <a:lnTo>
+                    <a:pt x="3261187" y="4369426"/>
+                  </a:lnTo>
+                  <a:lnTo>
+                    <a:pt x="3262350" y="4380960"/>
+                  </a:lnTo>
+                  <a:lnTo>
+                    <a:pt x="2059897" y="6098240"/>
+                  </a:lnTo>
+                  <a:cubicBezTo>
+                    <a:pt x="1975612" y="6218611"/>
+                    <a:pt x="2004866" y="6384518"/>
+                    <a:pt x="2125237" y="6468803"/>
+                  </a:cubicBezTo>
+                  <a:lnTo>
+                    <a:pt x="2257153" y="6561171"/>
+                  </a:lnTo>
+                  <a:cubicBezTo>
+                    <a:pt x="2377524" y="6645456"/>
+                    <a:pt x="2543431" y="6616202"/>
+                    <a:pt x="2627716" y="6495831"/>
+                  </a:cubicBezTo>
+                  <a:lnTo>
+                    <a:pt x="3799152" y="4822847"/>
+                  </a:lnTo>
+                  <a:lnTo>
+                    <a:pt x="3966526" y="4822847"/>
+                  </a:lnTo>
+                  <a:lnTo>
+                    <a:pt x="5137962" y="6495832"/>
+                  </a:lnTo>
+                  <a:cubicBezTo>
+                    <a:pt x="5222247" y="6616203"/>
+                    <a:pt x="5388154" y="6645457"/>
+                    <a:pt x="5508525" y="6561172"/>
+                  </a:cubicBezTo>
+                  <a:lnTo>
+                    <a:pt x="5640441" y="6468804"/>
+                  </a:lnTo>
+                  <a:cubicBezTo>
+                    <a:pt x="5760812" y="6384519"/>
+                    <a:pt x="5790066" y="6218612"/>
+                    <a:pt x="5705781" y="6098241"/>
+                  </a:cubicBezTo>
+                  <a:lnTo>
+                    <a:pt x="4503329" y="4380962"/>
+                  </a:lnTo>
+                  <a:lnTo>
+                    <a:pt x="4504492" y="4369426"/>
+                  </a:lnTo>
+                  <a:lnTo>
+                    <a:pt x="4504492" y="3182647"/>
+                  </a:lnTo>
+                  <a:lnTo>
+                    <a:pt x="4502987" y="3167720"/>
+                  </a:lnTo>
+                  <a:lnTo>
+                    <a:pt x="5936447" y="2628489"/>
+                  </a:lnTo>
+                  <a:cubicBezTo>
+                    <a:pt x="6075231" y="2576282"/>
+                    <a:pt x="6145415" y="2421454"/>
+                    <a:pt x="6093208" y="2282671"/>
+                  </a:cubicBezTo>
+                  <a:cubicBezTo>
+                    <a:pt x="6041001" y="2143887"/>
+                    <a:pt x="5886173" y="2073703"/>
+                    <a:pt x="5747390" y="2125910"/>
+                  </a:cubicBezTo>
+                  <a:lnTo>
+                    <a:pt x="4124021" y="2736580"/>
+                  </a:lnTo>
+                  <a:lnTo>
+                    <a:pt x="4051071" y="2729226"/>
+                  </a:lnTo>
+                  <a:lnTo>
+                    <a:pt x="3714608" y="2729226"/>
+                  </a:lnTo>
+                  <a:lnTo>
+                    <a:pt x="3641661" y="2736580"/>
+                  </a:lnTo>
+                  <a:lnTo>
+                    <a:pt x="2018289" y="2125909"/>
+                  </a:lnTo>
+                  <a:cubicBezTo>
+                    <a:pt x="1983593" y="2112857"/>
+                    <a:pt x="1947895" y="2107455"/>
+                    <a:pt x="1913047" y="2108862"/>
+                  </a:cubicBezTo>
+                  <a:close/>
+                  <a:moveTo>
+                    <a:pt x="3882839" y="1322738"/>
+                  </a:moveTo>
+                  <a:cubicBezTo>
+                    <a:pt x="3539510" y="1322738"/>
+                    <a:pt x="3261187" y="1601061"/>
+                    <a:pt x="3261187" y="1944390"/>
+                  </a:cubicBezTo>
+                  <a:cubicBezTo>
+                    <a:pt x="3261187" y="2287719"/>
+                    <a:pt x="3539510" y="2566042"/>
+                    <a:pt x="3882839" y="2566042"/>
+                  </a:cubicBezTo>
+                  <a:cubicBezTo>
+                    <a:pt x="4226168" y="2566042"/>
+                    <a:pt x="4504491" y="2287719"/>
+                    <a:pt x="4504491" y="1944390"/>
+                  </a:cubicBezTo>
+                  <a:cubicBezTo>
+                    <a:pt x="4504491" y="1601061"/>
+                    <a:pt x="4226168" y="1322738"/>
+                    <a:pt x="3882839" y="1322738"/>
+                  </a:cubicBezTo>
+                  <a:close/>
+                  <a:moveTo>
+                    <a:pt x="3529533" y="0"/>
+                  </a:moveTo>
+                  <a:lnTo>
+                    <a:pt x="4236146" y="0"/>
+                  </a:lnTo>
+                  <a:cubicBezTo>
+                    <a:pt x="4333712" y="0"/>
+                    <a:pt x="4412805" y="79092"/>
+                    <a:pt x="4412805" y="176658"/>
+                  </a:cubicBezTo>
+                  <a:lnTo>
+                    <a:pt x="4412805" y="517049"/>
+                  </a:lnTo>
+                  <a:lnTo>
+                    <a:pt x="4570286" y="541083"/>
+                  </a:lnTo>
+                  <a:lnTo>
+                    <a:pt x="4710315" y="577090"/>
+                  </a:lnTo>
+                  <a:lnTo>
+                    <a:pt x="4843124" y="264208"/>
+                  </a:lnTo>
+                  <a:cubicBezTo>
+                    <a:pt x="4881247" y="174398"/>
+                    <a:pt x="4984956" y="132497"/>
+                    <a:pt x="5074764" y="170620"/>
+                  </a:cubicBezTo>
+                  <a:lnTo>
+                    <a:pt x="5725207" y="446715"/>
+                  </a:lnTo>
+                  <a:cubicBezTo>
+                    <a:pt x="5815016" y="484838"/>
+                    <a:pt x="5856918" y="588545"/>
+                    <a:pt x="5818796" y="678355"/>
+                  </a:cubicBezTo>
+                  <a:lnTo>
+                    <a:pt x="5686014" y="991168"/>
+                  </a:lnTo>
+                  <a:lnTo>
+                    <a:pt x="5789993" y="1054338"/>
+                  </a:lnTo>
+                  <a:lnTo>
+                    <a:pt x="5888325" y="1127870"/>
+                  </a:lnTo>
+                  <a:lnTo>
+                    <a:pt x="6128765" y="887432"/>
+                  </a:lnTo>
+                  <a:cubicBezTo>
+                    <a:pt x="6197753" y="818442"/>
+                    <a:pt x="6309606" y="818442"/>
+                    <a:pt x="6378596" y="887432"/>
+                  </a:cubicBezTo>
+                  <a:lnTo>
+                    <a:pt x="6878249" y="1387083"/>
+                  </a:lnTo>
+                  <a:cubicBezTo>
+                    <a:pt x="6947237" y="1456072"/>
+                    <a:pt x="6947237" y="1567926"/>
+                    <a:pt x="6878249" y="1636916"/>
+                  </a:cubicBezTo>
+                  <a:lnTo>
+                    <a:pt x="6637809" y="1877354"/>
+                  </a:lnTo>
+                  <a:lnTo>
+                    <a:pt x="6711341" y="1975686"/>
+                  </a:lnTo>
+                  <a:lnTo>
+                    <a:pt x="6774511" y="2079665"/>
+                  </a:lnTo>
+                  <a:lnTo>
+                    <a:pt x="7087323" y="1946884"/>
+                  </a:lnTo>
+                  <a:cubicBezTo>
+                    <a:pt x="7177134" y="1908762"/>
+                    <a:pt x="7280842" y="1950663"/>
+                    <a:pt x="7318963" y="2040474"/>
+                  </a:cubicBezTo>
+                  <a:lnTo>
+                    <a:pt x="7595061" y="2690915"/>
+                  </a:lnTo>
+                  <a:cubicBezTo>
+                    <a:pt x="7633181" y="2780723"/>
+                    <a:pt x="7591281" y="2884432"/>
+                    <a:pt x="7501471" y="2922555"/>
+                  </a:cubicBezTo>
+                  <a:lnTo>
+                    <a:pt x="7188590" y="3055366"/>
+                  </a:lnTo>
+                  <a:lnTo>
+                    <a:pt x="7224595" y="3195391"/>
+                  </a:lnTo>
+                  <a:lnTo>
+                    <a:pt x="7248628" y="3352874"/>
+                  </a:lnTo>
+                  <a:lnTo>
+                    <a:pt x="7589021" y="3352874"/>
+                  </a:lnTo>
+                  <a:cubicBezTo>
+                    <a:pt x="7686586" y="3352874"/>
+                    <a:pt x="7765679" y="3431967"/>
+                    <a:pt x="7765679" y="3529533"/>
+                  </a:cubicBezTo>
+                  <a:lnTo>
+                    <a:pt x="7765679" y="4236146"/>
+                  </a:lnTo>
+                  <a:cubicBezTo>
+                    <a:pt x="7765679" y="4333712"/>
+                    <a:pt x="7686586" y="4412805"/>
+                    <a:pt x="7589021" y="4412805"/>
+                  </a:cubicBezTo>
+                  <a:lnTo>
+                    <a:pt x="7248628" y="4412805"/>
+                  </a:lnTo>
+                  <a:lnTo>
+                    <a:pt x="7224595" y="4570286"/>
+                  </a:lnTo>
+                  <a:lnTo>
+                    <a:pt x="7188590" y="4710315"/>
+                  </a:lnTo>
+                  <a:lnTo>
+                    <a:pt x="7501471" y="4843127"/>
+                  </a:lnTo>
+                  <a:cubicBezTo>
+                    <a:pt x="7591281" y="4881247"/>
+                    <a:pt x="7633181" y="4984956"/>
+                    <a:pt x="7595061" y="5074767"/>
+                  </a:cubicBezTo>
+                  <a:lnTo>
+                    <a:pt x="7318963" y="5725207"/>
+                  </a:lnTo>
+                  <a:cubicBezTo>
+                    <a:pt x="7280843" y="5815018"/>
+                    <a:pt x="7177134" y="5856918"/>
+                    <a:pt x="7087323" y="5818796"/>
+                  </a:cubicBezTo>
+                  <a:lnTo>
+                    <a:pt x="6774508" y="5686014"/>
+                  </a:lnTo>
+                  <a:lnTo>
+                    <a:pt x="6711341" y="5789993"/>
+                  </a:lnTo>
+                  <a:lnTo>
+                    <a:pt x="6637809" y="5888325"/>
+                  </a:lnTo>
+                  <a:lnTo>
+                    <a:pt x="6878249" y="6128765"/>
+                  </a:lnTo>
+                  <a:cubicBezTo>
+                    <a:pt x="6947237" y="6197753"/>
+                    <a:pt x="6947237" y="6309606"/>
+                    <a:pt x="6878249" y="6378596"/>
+                  </a:cubicBezTo>
+                  <a:lnTo>
+                    <a:pt x="6378596" y="6878249"/>
+                  </a:lnTo>
+                  <a:cubicBezTo>
+                    <a:pt x="6309606" y="6947237"/>
+                    <a:pt x="6197754" y="6947237"/>
+                    <a:pt x="6128765" y="6878249"/>
+                  </a:cubicBezTo>
+                  <a:lnTo>
+                    <a:pt x="5888325" y="6637809"/>
+                  </a:lnTo>
+                  <a:lnTo>
+                    <a:pt x="5789993" y="6711341"/>
+                  </a:lnTo>
+                  <a:lnTo>
+                    <a:pt x="5686014" y="6774508"/>
+                  </a:lnTo>
+                  <a:lnTo>
+                    <a:pt x="5818796" y="7087323"/>
+                  </a:lnTo>
+                  <a:cubicBezTo>
+                    <a:pt x="5856918" y="7177134"/>
+                    <a:pt x="5815018" y="7280843"/>
+                    <a:pt x="5725207" y="7318964"/>
+                  </a:cubicBezTo>
+                  <a:lnTo>
+                    <a:pt x="5074767" y="7595061"/>
+                  </a:lnTo>
+                  <a:cubicBezTo>
+                    <a:pt x="4984956" y="7633182"/>
+                    <a:pt x="4881247" y="7591281"/>
+                    <a:pt x="4843127" y="7501473"/>
+                  </a:cubicBezTo>
+                  <a:lnTo>
+                    <a:pt x="4710315" y="7188590"/>
+                  </a:lnTo>
+                  <a:lnTo>
+                    <a:pt x="4570286" y="7224595"/>
+                  </a:lnTo>
+                  <a:lnTo>
+                    <a:pt x="4412805" y="7248628"/>
+                  </a:lnTo>
+                  <a:lnTo>
+                    <a:pt x="4412805" y="7589021"/>
+                  </a:lnTo>
+                  <a:cubicBezTo>
+                    <a:pt x="4412805" y="7686586"/>
+                    <a:pt x="4333712" y="7765679"/>
+                    <a:pt x="4236146" y="7765679"/>
+                  </a:cubicBezTo>
+                  <a:lnTo>
+                    <a:pt x="3529533" y="7765679"/>
+                  </a:lnTo>
+                  <a:cubicBezTo>
+                    <a:pt x="3431967" y="7765679"/>
+                    <a:pt x="3352874" y="7686586"/>
+                    <a:pt x="3352874" y="7589021"/>
+                  </a:cubicBezTo>
+                  <a:lnTo>
+                    <a:pt x="3352874" y="7248628"/>
+                  </a:lnTo>
+                  <a:lnTo>
+                    <a:pt x="3195391" y="7224595"/>
+                  </a:lnTo>
+                  <a:lnTo>
+                    <a:pt x="3055364" y="7188590"/>
+                  </a:lnTo>
+                  <a:lnTo>
+                    <a:pt x="2922554" y="7501473"/>
+                  </a:lnTo>
+                  <a:cubicBezTo>
+                    <a:pt x="2884432" y="7591281"/>
+                    <a:pt x="2780723" y="7633182"/>
+                    <a:pt x="2690913" y="7595061"/>
+                  </a:cubicBezTo>
+                  <a:lnTo>
+                    <a:pt x="2040472" y="7318964"/>
+                  </a:lnTo>
+                  <a:cubicBezTo>
+                    <a:pt x="1950663" y="7280843"/>
+                    <a:pt x="1908761" y="7177134"/>
+                    <a:pt x="1946884" y="7087323"/>
+                  </a:cubicBezTo>
+                  <a:lnTo>
+                    <a:pt x="2079665" y="6774511"/>
+                  </a:lnTo>
+                  <a:lnTo>
+                    <a:pt x="1975685" y="6711341"/>
+                  </a:lnTo>
+                  <a:lnTo>
+                    <a:pt x="1877354" y="6637809"/>
+                  </a:lnTo>
+                  <a:lnTo>
+                    <a:pt x="1636915" y="6878249"/>
+                  </a:lnTo>
+                  <a:cubicBezTo>
+                    <a:pt x="1567926" y="6947237"/>
+                    <a:pt x="1456073" y="6947237"/>
+                    <a:pt x="1387083" y="6878249"/>
+                  </a:cubicBezTo>
+                  <a:lnTo>
+                    <a:pt x="887430" y="6378596"/>
+                  </a:lnTo>
+                  <a:cubicBezTo>
+                    <a:pt x="818442" y="6309606"/>
+                    <a:pt x="818442" y="6197753"/>
+                    <a:pt x="887430" y="6128765"/>
+                  </a:cubicBezTo>
+                  <a:lnTo>
+                    <a:pt x="1127870" y="5888325"/>
+                  </a:lnTo>
+                  <a:lnTo>
+                    <a:pt x="1054338" y="5789993"/>
+                  </a:lnTo>
+                  <a:lnTo>
+                    <a:pt x="991170" y="5686014"/>
+                  </a:lnTo>
+                  <a:lnTo>
+                    <a:pt x="678356" y="5818796"/>
+                  </a:lnTo>
+                  <a:cubicBezTo>
+                    <a:pt x="588545" y="5856918"/>
+                    <a:pt x="484836" y="5815018"/>
+                    <a:pt x="446715" y="5725207"/>
+                  </a:cubicBezTo>
+                  <a:lnTo>
+                    <a:pt x="170618" y="5074767"/>
+                  </a:lnTo>
+                  <a:cubicBezTo>
+                    <a:pt x="132497" y="4984956"/>
+                    <a:pt x="174398" y="4881247"/>
+                    <a:pt x="264206" y="4843127"/>
+                  </a:cubicBezTo>
+                  <a:lnTo>
+                    <a:pt x="577090" y="4710315"/>
+                  </a:lnTo>
+                  <a:lnTo>
+                    <a:pt x="541083" y="4570286"/>
+                  </a:lnTo>
+                  <a:lnTo>
+                    <a:pt x="517049" y="4412805"/>
+                  </a:lnTo>
+                  <a:lnTo>
+                    <a:pt x="176658" y="4412805"/>
+                  </a:lnTo>
+                  <a:cubicBezTo>
+                    <a:pt x="79093" y="4412805"/>
+                    <a:pt x="0" y="4333712"/>
+                    <a:pt x="0" y="4236146"/>
+                  </a:cubicBezTo>
+                  <a:lnTo>
+                    <a:pt x="0" y="3529533"/>
+                  </a:lnTo>
+                  <a:cubicBezTo>
+                    <a:pt x="0" y="3431967"/>
+                    <a:pt x="79093" y="3352874"/>
+                    <a:pt x="176658" y="3352874"/>
+                  </a:cubicBezTo>
+                  <a:lnTo>
+                    <a:pt x="517049" y="3352874"/>
+                  </a:lnTo>
+                  <a:lnTo>
+                    <a:pt x="541083" y="3195391"/>
+                  </a:lnTo>
+                  <a:lnTo>
+                    <a:pt x="577088" y="3055364"/>
+                  </a:lnTo>
+                  <a:lnTo>
+                    <a:pt x="264208" y="2922555"/>
+                  </a:lnTo>
+                  <a:cubicBezTo>
+                    <a:pt x="174398" y="2884432"/>
+                    <a:pt x="132497" y="2780723"/>
+                    <a:pt x="170618" y="2690915"/>
+                  </a:cubicBezTo>
+                  <a:lnTo>
+                    <a:pt x="446715" y="2040474"/>
+                  </a:lnTo>
+                  <a:cubicBezTo>
+                    <a:pt x="484836" y="1950663"/>
+                    <a:pt x="588545" y="1908762"/>
+                    <a:pt x="678356" y="1946884"/>
+                  </a:cubicBezTo>
+                  <a:lnTo>
+                    <a:pt x="991170" y="2079665"/>
+                  </a:lnTo>
+                  <a:lnTo>
+                    <a:pt x="1054338" y="1975686"/>
+                  </a:lnTo>
+                  <a:lnTo>
+                    <a:pt x="1127870" y="1877354"/>
+                  </a:lnTo>
+                  <a:lnTo>
+                    <a:pt x="887432" y="1636916"/>
+                  </a:lnTo>
+                  <a:cubicBezTo>
+                    <a:pt x="818442" y="1567926"/>
+                    <a:pt x="818442" y="1456072"/>
+                    <a:pt x="887432" y="1387083"/>
+                  </a:cubicBezTo>
+                  <a:lnTo>
+                    <a:pt x="1387083" y="887432"/>
+                  </a:lnTo>
+                  <a:cubicBezTo>
+                    <a:pt x="1456073" y="818442"/>
+                    <a:pt x="1567926" y="818442"/>
+                    <a:pt x="1636915" y="887432"/>
+                  </a:cubicBezTo>
+                  <a:lnTo>
+                    <a:pt x="1877353" y="1127870"/>
+                  </a:lnTo>
+                  <a:lnTo>
+                    <a:pt x="1975685" y="1054338"/>
+                  </a:lnTo>
+                  <a:lnTo>
+                    <a:pt x="2079665" y="991168"/>
+                  </a:lnTo>
+                  <a:lnTo>
+                    <a:pt x="1946884" y="678355"/>
+                  </a:lnTo>
+                  <a:cubicBezTo>
+                    <a:pt x="1908761" y="588545"/>
+                    <a:pt x="1950663" y="484838"/>
+                    <a:pt x="2040472" y="446715"/>
+                  </a:cubicBezTo>
+                  <a:lnTo>
+                    <a:pt x="2690915" y="170620"/>
+                  </a:lnTo>
+                  <a:cubicBezTo>
+                    <a:pt x="2780723" y="132497"/>
+                    <a:pt x="2884432" y="174398"/>
+                    <a:pt x="2922555" y="264208"/>
+                  </a:cubicBezTo>
+                  <a:lnTo>
+                    <a:pt x="3055364" y="577088"/>
+                  </a:lnTo>
+                  <a:lnTo>
+                    <a:pt x="3195391" y="541083"/>
+                  </a:lnTo>
+                  <a:lnTo>
+                    <a:pt x="3352874" y="517049"/>
+                  </a:lnTo>
+                  <a:lnTo>
+                    <a:pt x="3352874" y="176658"/>
+                  </a:lnTo>
+                  <a:cubicBezTo>
+                    <a:pt x="3352874" y="79092"/>
+                    <a:pt x="3431967" y="0"/>
+                    <a:pt x="3529533" y="0"/>
+                  </a:cubicBezTo>
+                  <a:close/>
+                </a:path>
+              </a:pathLst>
+            </a:custGeom>
+            <a:gradFill flip="none" rotWithShape="1">
+              <a:gsLst>
+                <a:gs pos="0">
+                  <a:srgbClr val="330066"/>
+                </a:gs>
+                <a:gs pos="100000">
+                  <a:srgbClr val="330066"/>
+                </a:gs>
+                <a:gs pos="43000">
+                  <a:srgbClr val="660099"/>
+                </a:gs>
+                <a:gs pos="48000">
+                  <a:srgbClr val="660099"/>
+                </a:gs>
+              </a:gsLst>
+              <a:lin ang="0" scaled="1"/>
+              <a:tileRect/>
+            </a:gradFill>
+            <a:ln w="190500">
+              <a:noFill/>
+            </a:ln>
+            <a:effectLst/>
+          </p:spPr>
+          <p:style>
+            <a:lnRef idx="1">
+              <a:schemeClr val="accent1"/>
+            </a:lnRef>
+            <a:fillRef idx="3">
+              <a:schemeClr val="accent1"/>
+            </a:fillRef>
+            <a:effectRef idx="2">
+              <a:schemeClr val="accent1"/>
+            </a:effectRef>
+            <a:fontRef idx="minor">
+              <a:schemeClr val="lt1"/>
+            </a:fontRef>
+          </p:style>
+          <p:txBody>
+            <a:bodyPr rot="0" spcFirstLastPara="0" vertOverflow="overflow" horzOverflow="overflow" vert="horz" wrap="square" lIns="91440" tIns="45720" rIns="91440" bIns="45720" numCol="1" spcCol="0" rtlCol="0" fromWordArt="0" anchor="ctr" anchorCtr="0" forceAA="0" compatLnSpc="1">
+              <a:prstTxWarp prst="textNoShape">
+                <a:avLst/>
+              </a:prstTxWarp>
+              <a:noAutofit/>
+            </a:bodyPr>
+            <a:lstStyle/>
+            <a:p>
+              <a:pPr algn="ctr"/>
+              <a:endParaRPr lang="en-US"/>
+            </a:p>
+          </p:txBody>
+        </p:sp>
+        <p:sp>
+          <p:nvSpPr>
+            <p:cNvPr id="3" name="TextBox 2"/>
+            <p:cNvSpPr txBox="1"/>
+            <p:nvPr/>
+          </p:nvSpPr>
+          <p:spPr>
+            <a:xfrm>
+              <a:off x="4006311" y="1954703"/>
+              <a:ext cx="6152827" cy="1323439"/>
+            </a:xfrm>
+            <a:prstGeom prst="rect">
+              <a:avLst/>
+            </a:prstGeom>
+            <a:noFill/>
+          </p:spPr>
+          <p:txBody>
+            <a:bodyPr wrap="square" rtlCol="0">
+              <a:spAutoFit/>
+            </a:bodyPr>
+            <a:lstStyle/>
+            <a:p>
+              <a:r>
+                <a:rPr lang="en-US" sz="8000" dirty="0" smtClean="0">
+                  <a:solidFill>
+                    <a:srgbClr val="430084"/>
+                  </a:solidFill>
+                </a:rPr>
+                <a:t>Human-SE Lab</a:t>
+              </a:r>
+              <a:endParaRPr lang="en-US" sz="8000" dirty="0">
+                <a:solidFill>
+                  <a:srgbClr val="430084"/>
+                </a:solidFill>
+              </a:endParaRPr>
+            </a:p>
+          </p:txBody>
+        </p:sp>
+      </p:grpSp>
+    </p:spTree>
+    <p:extLst>
+      <p:ext uri="{BB962C8B-B14F-4D97-AF65-F5344CB8AC3E}">
+        <p14:creationId xmlns:p14="http://schemas.microsoft.com/office/powerpoint/2010/main" val="4001461138"/>
+      </p:ext>
+    </p:extLst>
+  </p:cSld>
+  <p:clrMapOvr>
+    <a:masterClrMapping/>
+  </p:clrMapOvr>
+  <p:timing>
+    <p:tnLst>
+      <p:par>
+        <p:cTn id="1" dur="indefinite" restart="never" nodeType="tmRoot"/>
+      </p:par>
+    </p:tnLst>
+  </p:timing>
+</p:sld>
+</file>
+
 <file path=ppt/theme/theme1.xml><?xml version="1.0" encoding="utf-8"?>
 <a:theme xmlns:a="http://schemas.openxmlformats.org/drawingml/2006/main" name="Office Theme">
   <a:themeElements>
@@ -3842,7 +4543,7 @@
   <a:extraClrSchemeLst/>
   <a:extLst>
     <a:ext uri="{05A4C25C-085E-4340-85A3-A5531E510DB2}">
-      <thm15:themeFamily xmlns:thm15="http://schemas.microsoft.com/office/thememl/2012/main" name="Office Theme" id="{62F939B6-93AF-4DB8-9C6B-D6C7DFDC589F}" vid="{4A3C46E8-61CC-4603-A589-7422A47A8E4A}"/>
+      <thm15:themeFamily xmlns:thm15="http://schemas.microsoft.com/office/thememl/2012/main" xmlns="" name="Office Theme" id="{62F939B6-93AF-4DB8-9C6B-D6C7DFDC589F}" vid="{4A3C46E8-61CC-4603-A589-7422A47A8E4A}"/>
     </a:ext>
   </a:extLst>
 </a:theme>

</xml_diff>

<commit_message>
Updated index to show new changes
</commit_message>
<xml_diff>
--- a/human-se-logo.pptx
+++ b/human-se-logo.pptx
@@ -6,7 +6,6 @@
   </p:sldMasterIdLst>
   <p:sldIdLst>
     <p:sldId id="257" r:id="rId2"/>
-    <p:sldId id="258" r:id="rId3"/>
   </p:sldIdLst>
   <p:sldSz cx="12192000" cy="6858000"/>
   <p:notesSz cx="6858000" cy="9144000"/>
@@ -239,7 +238,7 @@
           <a:p>
             <a:fld id="{8044A842-A64A-7845-831F-0E2FF016D7FA}" type="datetimeFigureOut">
               <a:rPr lang="en-US" smtClean="0"/>
-              <a:t>12/16/2016</a:t>
+              <a:t>9/2/16</a:t>
             </a:fld>
             <a:endParaRPr lang="en-US"/>
           </a:p>
@@ -409,7 +408,7 @@
           <a:p>
             <a:fld id="{8044A842-A64A-7845-831F-0E2FF016D7FA}" type="datetimeFigureOut">
               <a:rPr lang="en-US" smtClean="0"/>
-              <a:t>12/16/2016</a:t>
+              <a:t>9/2/16</a:t>
             </a:fld>
             <a:endParaRPr lang="en-US"/>
           </a:p>
@@ -589,7 +588,7 @@
           <a:p>
             <a:fld id="{8044A842-A64A-7845-831F-0E2FF016D7FA}" type="datetimeFigureOut">
               <a:rPr lang="en-US" smtClean="0"/>
-              <a:t>12/16/2016</a:t>
+              <a:t>9/2/16</a:t>
             </a:fld>
             <a:endParaRPr lang="en-US"/>
           </a:p>
@@ -759,7 +758,7 @@
           <a:p>
             <a:fld id="{8044A842-A64A-7845-831F-0E2FF016D7FA}" type="datetimeFigureOut">
               <a:rPr lang="en-US" smtClean="0"/>
-              <a:t>12/16/2016</a:t>
+              <a:t>9/2/16</a:t>
             </a:fld>
             <a:endParaRPr lang="en-US"/>
           </a:p>
@@ -1005,7 +1004,7 @@
           <a:p>
             <a:fld id="{8044A842-A64A-7845-831F-0E2FF016D7FA}" type="datetimeFigureOut">
               <a:rPr lang="en-US" smtClean="0"/>
-              <a:t>12/16/2016</a:t>
+              <a:t>9/2/16</a:t>
             </a:fld>
             <a:endParaRPr lang="en-US"/>
           </a:p>
@@ -1237,7 +1236,7 @@
           <a:p>
             <a:fld id="{8044A842-A64A-7845-831F-0E2FF016D7FA}" type="datetimeFigureOut">
               <a:rPr lang="en-US" smtClean="0"/>
-              <a:t>12/16/2016</a:t>
+              <a:t>9/2/16</a:t>
             </a:fld>
             <a:endParaRPr lang="en-US"/>
           </a:p>
@@ -1604,7 +1603,7 @@
           <a:p>
             <a:fld id="{8044A842-A64A-7845-831F-0E2FF016D7FA}" type="datetimeFigureOut">
               <a:rPr lang="en-US" smtClean="0"/>
-              <a:t>12/16/2016</a:t>
+              <a:t>9/2/16</a:t>
             </a:fld>
             <a:endParaRPr lang="en-US"/>
           </a:p>
@@ -1722,7 +1721,7 @@
           <a:p>
             <a:fld id="{8044A842-A64A-7845-831F-0E2FF016D7FA}" type="datetimeFigureOut">
               <a:rPr lang="en-US" smtClean="0"/>
-              <a:t>12/16/2016</a:t>
+              <a:t>9/2/16</a:t>
             </a:fld>
             <a:endParaRPr lang="en-US"/>
           </a:p>
@@ -1817,7 +1816,7 @@
           <a:p>
             <a:fld id="{8044A842-A64A-7845-831F-0E2FF016D7FA}" type="datetimeFigureOut">
               <a:rPr lang="en-US" smtClean="0"/>
-              <a:t>12/16/2016</a:t>
+              <a:t>9/2/16</a:t>
             </a:fld>
             <a:endParaRPr lang="en-US"/>
           </a:p>
@@ -2094,7 +2093,7 @@
           <a:p>
             <a:fld id="{8044A842-A64A-7845-831F-0E2FF016D7FA}" type="datetimeFigureOut">
               <a:rPr lang="en-US" smtClean="0"/>
-              <a:t>12/16/2016</a:t>
+              <a:t>9/2/16</a:t>
             </a:fld>
             <a:endParaRPr lang="en-US"/>
           </a:p>
@@ -2347,7 +2346,7 @@
           <a:p>
             <a:fld id="{8044A842-A64A-7845-831F-0E2FF016D7FA}" type="datetimeFigureOut">
               <a:rPr lang="en-US" smtClean="0"/>
-              <a:t>12/16/2016</a:t>
+              <a:t>9/2/16</a:t>
             </a:fld>
             <a:endParaRPr lang="en-US"/>
           </a:p>
@@ -2560,7 +2559,7 @@
           <a:p>
             <a:fld id="{8044A842-A64A-7845-831F-0E2FF016D7FA}" type="datetimeFigureOut">
               <a:rPr lang="en-US" smtClean="0"/>
-              <a:t>12/16/2016</a:t>
+              <a:t>9/2/16</a:t>
             </a:fld>
             <a:endParaRPr lang="en-US"/>
           </a:p>
@@ -3588,706 +3587,6 @@
 </p:sld>
 </file>
 
-<file path=ppt/slides/slide2.xml><?xml version="1.0" encoding="utf-8"?>
-<p:sld xmlns:a="http://schemas.openxmlformats.org/drawingml/2006/main" xmlns:r="http://schemas.openxmlformats.org/officeDocument/2006/relationships" xmlns:p="http://schemas.openxmlformats.org/presentationml/2006/main">
-  <p:cSld>
-    <p:spTree>
-      <p:nvGrpSpPr>
-        <p:cNvPr id="1" name=""/>
-        <p:cNvGrpSpPr/>
-        <p:nvPr/>
-      </p:nvGrpSpPr>
-      <p:grpSpPr>
-        <a:xfrm>
-          <a:off x="0" y="0"/>
-          <a:ext cx="0" cy="0"/>
-          <a:chOff x="0" y="0"/>
-          <a:chExt cx="0" cy="0"/>
-        </a:xfrm>
-      </p:grpSpPr>
-      <p:grpSp>
-        <p:nvGrpSpPr>
-          <p:cNvPr id="4" name="Group 3"/>
-          <p:cNvGrpSpPr/>
-          <p:nvPr/>
-        </p:nvGrpSpPr>
-        <p:grpSpPr>
-          <a:xfrm>
-            <a:off x="447113" y="1016223"/>
-            <a:ext cx="9712025" cy="3200400"/>
-            <a:chOff x="447113" y="1016223"/>
-            <a:chExt cx="9712025" cy="3200400"/>
-          </a:xfrm>
-        </p:grpSpPr>
-        <p:sp>
-          <p:nvSpPr>
-            <p:cNvPr id="2" name="Oval 2"/>
-            <p:cNvSpPr/>
-            <p:nvPr/>
-          </p:nvSpPr>
-          <p:spPr>
-            <a:xfrm>
-              <a:off x="447113" y="1016223"/>
-              <a:ext cx="3202738" cy="3200400"/>
-            </a:xfrm>
-            <a:custGeom>
-              <a:avLst/>
-              <a:gdLst/>
-              <a:ahLst/>
-              <a:cxnLst/>
-              <a:rect l="l" t="t" r="r" b="b"/>
-              <a:pathLst>
-                <a:path w="7765679" h="7765679">
-                  <a:moveTo>
-                    <a:pt x="1913047" y="2108862"/>
-                  </a:moveTo>
-                  <a:cubicBezTo>
-                    <a:pt x="1808506" y="2113082"/>
-                    <a:pt x="1711626" y="2178582"/>
-                    <a:pt x="1672471" y="2282670"/>
-                  </a:cubicBezTo>
-                  <a:cubicBezTo>
-                    <a:pt x="1620264" y="2421453"/>
-                    <a:pt x="1690448" y="2576281"/>
-                    <a:pt x="1829232" y="2628488"/>
-                  </a:cubicBezTo>
-                  <a:lnTo>
-                    <a:pt x="3262692" y="3167719"/>
-                  </a:lnTo>
-                  <a:lnTo>
-                    <a:pt x="3261187" y="3182647"/>
-                  </a:lnTo>
-                  <a:lnTo>
-                    <a:pt x="3261187" y="4369426"/>
-                  </a:lnTo>
-                  <a:lnTo>
-                    <a:pt x="3262350" y="4380960"/>
-                  </a:lnTo>
-                  <a:lnTo>
-                    <a:pt x="2059897" y="6098240"/>
-                  </a:lnTo>
-                  <a:cubicBezTo>
-                    <a:pt x="1975612" y="6218611"/>
-                    <a:pt x="2004866" y="6384518"/>
-                    <a:pt x="2125237" y="6468803"/>
-                  </a:cubicBezTo>
-                  <a:lnTo>
-                    <a:pt x="2257153" y="6561171"/>
-                  </a:lnTo>
-                  <a:cubicBezTo>
-                    <a:pt x="2377524" y="6645456"/>
-                    <a:pt x="2543431" y="6616202"/>
-                    <a:pt x="2627716" y="6495831"/>
-                  </a:cubicBezTo>
-                  <a:lnTo>
-                    <a:pt x="3799152" y="4822847"/>
-                  </a:lnTo>
-                  <a:lnTo>
-                    <a:pt x="3966526" y="4822847"/>
-                  </a:lnTo>
-                  <a:lnTo>
-                    <a:pt x="5137962" y="6495832"/>
-                  </a:lnTo>
-                  <a:cubicBezTo>
-                    <a:pt x="5222247" y="6616203"/>
-                    <a:pt x="5388154" y="6645457"/>
-                    <a:pt x="5508525" y="6561172"/>
-                  </a:cubicBezTo>
-                  <a:lnTo>
-                    <a:pt x="5640441" y="6468804"/>
-                  </a:lnTo>
-                  <a:cubicBezTo>
-                    <a:pt x="5760812" y="6384519"/>
-                    <a:pt x="5790066" y="6218612"/>
-                    <a:pt x="5705781" y="6098241"/>
-                  </a:cubicBezTo>
-                  <a:lnTo>
-                    <a:pt x="4503329" y="4380962"/>
-                  </a:lnTo>
-                  <a:lnTo>
-                    <a:pt x="4504492" y="4369426"/>
-                  </a:lnTo>
-                  <a:lnTo>
-                    <a:pt x="4504492" y="3182647"/>
-                  </a:lnTo>
-                  <a:lnTo>
-                    <a:pt x="4502987" y="3167720"/>
-                  </a:lnTo>
-                  <a:lnTo>
-                    <a:pt x="5936447" y="2628489"/>
-                  </a:lnTo>
-                  <a:cubicBezTo>
-                    <a:pt x="6075231" y="2576282"/>
-                    <a:pt x="6145415" y="2421454"/>
-                    <a:pt x="6093208" y="2282671"/>
-                  </a:cubicBezTo>
-                  <a:cubicBezTo>
-                    <a:pt x="6041001" y="2143887"/>
-                    <a:pt x="5886173" y="2073703"/>
-                    <a:pt x="5747390" y="2125910"/>
-                  </a:cubicBezTo>
-                  <a:lnTo>
-                    <a:pt x="4124021" y="2736580"/>
-                  </a:lnTo>
-                  <a:lnTo>
-                    <a:pt x="4051071" y="2729226"/>
-                  </a:lnTo>
-                  <a:lnTo>
-                    <a:pt x="3714608" y="2729226"/>
-                  </a:lnTo>
-                  <a:lnTo>
-                    <a:pt x="3641661" y="2736580"/>
-                  </a:lnTo>
-                  <a:lnTo>
-                    <a:pt x="2018289" y="2125909"/>
-                  </a:lnTo>
-                  <a:cubicBezTo>
-                    <a:pt x="1983593" y="2112857"/>
-                    <a:pt x="1947895" y="2107455"/>
-                    <a:pt x="1913047" y="2108862"/>
-                  </a:cubicBezTo>
-                  <a:close/>
-                  <a:moveTo>
-                    <a:pt x="3882839" y="1322738"/>
-                  </a:moveTo>
-                  <a:cubicBezTo>
-                    <a:pt x="3539510" y="1322738"/>
-                    <a:pt x="3261187" y="1601061"/>
-                    <a:pt x="3261187" y="1944390"/>
-                  </a:cubicBezTo>
-                  <a:cubicBezTo>
-                    <a:pt x="3261187" y="2287719"/>
-                    <a:pt x="3539510" y="2566042"/>
-                    <a:pt x="3882839" y="2566042"/>
-                  </a:cubicBezTo>
-                  <a:cubicBezTo>
-                    <a:pt x="4226168" y="2566042"/>
-                    <a:pt x="4504491" y="2287719"/>
-                    <a:pt x="4504491" y="1944390"/>
-                  </a:cubicBezTo>
-                  <a:cubicBezTo>
-                    <a:pt x="4504491" y="1601061"/>
-                    <a:pt x="4226168" y="1322738"/>
-                    <a:pt x="3882839" y="1322738"/>
-                  </a:cubicBezTo>
-                  <a:close/>
-                  <a:moveTo>
-                    <a:pt x="3529533" y="0"/>
-                  </a:moveTo>
-                  <a:lnTo>
-                    <a:pt x="4236146" y="0"/>
-                  </a:lnTo>
-                  <a:cubicBezTo>
-                    <a:pt x="4333712" y="0"/>
-                    <a:pt x="4412805" y="79092"/>
-                    <a:pt x="4412805" y="176658"/>
-                  </a:cubicBezTo>
-                  <a:lnTo>
-                    <a:pt x="4412805" y="517049"/>
-                  </a:lnTo>
-                  <a:lnTo>
-                    <a:pt x="4570286" y="541083"/>
-                  </a:lnTo>
-                  <a:lnTo>
-                    <a:pt x="4710315" y="577090"/>
-                  </a:lnTo>
-                  <a:lnTo>
-                    <a:pt x="4843124" y="264208"/>
-                  </a:lnTo>
-                  <a:cubicBezTo>
-                    <a:pt x="4881247" y="174398"/>
-                    <a:pt x="4984956" y="132497"/>
-                    <a:pt x="5074764" y="170620"/>
-                  </a:cubicBezTo>
-                  <a:lnTo>
-                    <a:pt x="5725207" y="446715"/>
-                  </a:lnTo>
-                  <a:cubicBezTo>
-                    <a:pt x="5815016" y="484838"/>
-                    <a:pt x="5856918" y="588545"/>
-                    <a:pt x="5818796" y="678355"/>
-                  </a:cubicBezTo>
-                  <a:lnTo>
-                    <a:pt x="5686014" y="991168"/>
-                  </a:lnTo>
-                  <a:lnTo>
-                    <a:pt x="5789993" y="1054338"/>
-                  </a:lnTo>
-                  <a:lnTo>
-                    <a:pt x="5888325" y="1127870"/>
-                  </a:lnTo>
-                  <a:lnTo>
-                    <a:pt x="6128765" y="887432"/>
-                  </a:lnTo>
-                  <a:cubicBezTo>
-                    <a:pt x="6197753" y="818442"/>
-                    <a:pt x="6309606" y="818442"/>
-                    <a:pt x="6378596" y="887432"/>
-                  </a:cubicBezTo>
-                  <a:lnTo>
-                    <a:pt x="6878249" y="1387083"/>
-                  </a:lnTo>
-                  <a:cubicBezTo>
-                    <a:pt x="6947237" y="1456072"/>
-                    <a:pt x="6947237" y="1567926"/>
-                    <a:pt x="6878249" y="1636916"/>
-                  </a:cubicBezTo>
-                  <a:lnTo>
-                    <a:pt x="6637809" y="1877354"/>
-                  </a:lnTo>
-                  <a:lnTo>
-                    <a:pt x="6711341" y="1975686"/>
-                  </a:lnTo>
-                  <a:lnTo>
-                    <a:pt x="6774511" y="2079665"/>
-                  </a:lnTo>
-                  <a:lnTo>
-                    <a:pt x="7087323" y="1946884"/>
-                  </a:lnTo>
-                  <a:cubicBezTo>
-                    <a:pt x="7177134" y="1908762"/>
-                    <a:pt x="7280842" y="1950663"/>
-                    <a:pt x="7318963" y="2040474"/>
-                  </a:cubicBezTo>
-                  <a:lnTo>
-                    <a:pt x="7595061" y="2690915"/>
-                  </a:lnTo>
-                  <a:cubicBezTo>
-                    <a:pt x="7633181" y="2780723"/>
-                    <a:pt x="7591281" y="2884432"/>
-                    <a:pt x="7501471" y="2922555"/>
-                  </a:cubicBezTo>
-                  <a:lnTo>
-                    <a:pt x="7188590" y="3055366"/>
-                  </a:lnTo>
-                  <a:lnTo>
-                    <a:pt x="7224595" y="3195391"/>
-                  </a:lnTo>
-                  <a:lnTo>
-                    <a:pt x="7248628" y="3352874"/>
-                  </a:lnTo>
-                  <a:lnTo>
-                    <a:pt x="7589021" y="3352874"/>
-                  </a:lnTo>
-                  <a:cubicBezTo>
-                    <a:pt x="7686586" y="3352874"/>
-                    <a:pt x="7765679" y="3431967"/>
-                    <a:pt x="7765679" y="3529533"/>
-                  </a:cubicBezTo>
-                  <a:lnTo>
-                    <a:pt x="7765679" y="4236146"/>
-                  </a:lnTo>
-                  <a:cubicBezTo>
-                    <a:pt x="7765679" y="4333712"/>
-                    <a:pt x="7686586" y="4412805"/>
-                    <a:pt x="7589021" y="4412805"/>
-                  </a:cubicBezTo>
-                  <a:lnTo>
-                    <a:pt x="7248628" y="4412805"/>
-                  </a:lnTo>
-                  <a:lnTo>
-                    <a:pt x="7224595" y="4570286"/>
-                  </a:lnTo>
-                  <a:lnTo>
-                    <a:pt x="7188590" y="4710315"/>
-                  </a:lnTo>
-                  <a:lnTo>
-                    <a:pt x="7501471" y="4843127"/>
-                  </a:lnTo>
-                  <a:cubicBezTo>
-                    <a:pt x="7591281" y="4881247"/>
-                    <a:pt x="7633181" y="4984956"/>
-                    <a:pt x="7595061" y="5074767"/>
-                  </a:cubicBezTo>
-                  <a:lnTo>
-                    <a:pt x="7318963" y="5725207"/>
-                  </a:lnTo>
-                  <a:cubicBezTo>
-                    <a:pt x="7280843" y="5815018"/>
-                    <a:pt x="7177134" y="5856918"/>
-                    <a:pt x="7087323" y="5818796"/>
-                  </a:cubicBezTo>
-                  <a:lnTo>
-                    <a:pt x="6774508" y="5686014"/>
-                  </a:lnTo>
-                  <a:lnTo>
-                    <a:pt x="6711341" y="5789993"/>
-                  </a:lnTo>
-                  <a:lnTo>
-                    <a:pt x="6637809" y="5888325"/>
-                  </a:lnTo>
-                  <a:lnTo>
-                    <a:pt x="6878249" y="6128765"/>
-                  </a:lnTo>
-                  <a:cubicBezTo>
-                    <a:pt x="6947237" y="6197753"/>
-                    <a:pt x="6947237" y="6309606"/>
-                    <a:pt x="6878249" y="6378596"/>
-                  </a:cubicBezTo>
-                  <a:lnTo>
-                    <a:pt x="6378596" y="6878249"/>
-                  </a:lnTo>
-                  <a:cubicBezTo>
-                    <a:pt x="6309606" y="6947237"/>
-                    <a:pt x="6197754" y="6947237"/>
-                    <a:pt x="6128765" y="6878249"/>
-                  </a:cubicBezTo>
-                  <a:lnTo>
-                    <a:pt x="5888325" y="6637809"/>
-                  </a:lnTo>
-                  <a:lnTo>
-                    <a:pt x="5789993" y="6711341"/>
-                  </a:lnTo>
-                  <a:lnTo>
-                    <a:pt x="5686014" y="6774508"/>
-                  </a:lnTo>
-                  <a:lnTo>
-                    <a:pt x="5818796" y="7087323"/>
-                  </a:lnTo>
-                  <a:cubicBezTo>
-                    <a:pt x="5856918" y="7177134"/>
-                    <a:pt x="5815018" y="7280843"/>
-                    <a:pt x="5725207" y="7318964"/>
-                  </a:cubicBezTo>
-                  <a:lnTo>
-                    <a:pt x="5074767" y="7595061"/>
-                  </a:lnTo>
-                  <a:cubicBezTo>
-                    <a:pt x="4984956" y="7633182"/>
-                    <a:pt x="4881247" y="7591281"/>
-                    <a:pt x="4843127" y="7501473"/>
-                  </a:cubicBezTo>
-                  <a:lnTo>
-                    <a:pt x="4710315" y="7188590"/>
-                  </a:lnTo>
-                  <a:lnTo>
-                    <a:pt x="4570286" y="7224595"/>
-                  </a:lnTo>
-                  <a:lnTo>
-                    <a:pt x="4412805" y="7248628"/>
-                  </a:lnTo>
-                  <a:lnTo>
-                    <a:pt x="4412805" y="7589021"/>
-                  </a:lnTo>
-                  <a:cubicBezTo>
-                    <a:pt x="4412805" y="7686586"/>
-                    <a:pt x="4333712" y="7765679"/>
-                    <a:pt x="4236146" y="7765679"/>
-                  </a:cubicBezTo>
-                  <a:lnTo>
-                    <a:pt x="3529533" y="7765679"/>
-                  </a:lnTo>
-                  <a:cubicBezTo>
-                    <a:pt x="3431967" y="7765679"/>
-                    <a:pt x="3352874" y="7686586"/>
-                    <a:pt x="3352874" y="7589021"/>
-                  </a:cubicBezTo>
-                  <a:lnTo>
-                    <a:pt x="3352874" y="7248628"/>
-                  </a:lnTo>
-                  <a:lnTo>
-                    <a:pt x="3195391" y="7224595"/>
-                  </a:lnTo>
-                  <a:lnTo>
-                    <a:pt x="3055364" y="7188590"/>
-                  </a:lnTo>
-                  <a:lnTo>
-                    <a:pt x="2922554" y="7501473"/>
-                  </a:lnTo>
-                  <a:cubicBezTo>
-                    <a:pt x="2884432" y="7591281"/>
-                    <a:pt x="2780723" y="7633182"/>
-                    <a:pt x="2690913" y="7595061"/>
-                  </a:cubicBezTo>
-                  <a:lnTo>
-                    <a:pt x="2040472" y="7318964"/>
-                  </a:lnTo>
-                  <a:cubicBezTo>
-                    <a:pt x="1950663" y="7280843"/>
-                    <a:pt x="1908761" y="7177134"/>
-                    <a:pt x="1946884" y="7087323"/>
-                  </a:cubicBezTo>
-                  <a:lnTo>
-                    <a:pt x="2079665" y="6774511"/>
-                  </a:lnTo>
-                  <a:lnTo>
-                    <a:pt x="1975685" y="6711341"/>
-                  </a:lnTo>
-                  <a:lnTo>
-                    <a:pt x="1877354" y="6637809"/>
-                  </a:lnTo>
-                  <a:lnTo>
-                    <a:pt x="1636915" y="6878249"/>
-                  </a:lnTo>
-                  <a:cubicBezTo>
-                    <a:pt x="1567926" y="6947237"/>
-                    <a:pt x="1456073" y="6947237"/>
-                    <a:pt x="1387083" y="6878249"/>
-                  </a:cubicBezTo>
-                  <a:lnTo>
-                    <a:pt x="887430" y="6378596"/>
-                  </a:lnTo>
-                  <a:cubicBezTo>
-                    <a:pt x="818442" y="6309606"/>
-                    <a:pt x="818442" y="6197753"/>
-                    <a:pt x="887430" y="6128765"/>
-                  </a:cubicBezTo>
-                  <a:lnTo>
-                    <a:pt x="1127870" y="5888325"/>
-                  </a:lnTo>
-                  <a:lnTo>
-                    <a:pt x="1054338" y="5789993"/>
-                  </a:lnTo>
-                  <a:lnTo>
-                    <a:pt x="991170" y="5686014"/>
-                  </a:lnTo>
-                  <a:lnTo>
-                    <a:pt x="678356" y="5818796"/>
-                  </a:lnTo>
-                  <a:cubicBezTo>
-                    <a:pt x="588545" y="5856918"/>
-                    <a:pt x="484836" y="5815018"/>
-                    <a:pt x="446715" y="5725207"/>
-                  </a:cubicBezTo>
-                  <a:lnTo>
-                    <a:pt x="170618" y="5074767"/>
-                  </a:lnTo>
-                  <a:cubicBezTo>
-                    <a:pt x="132497" y="4984956"/>
-                    <a:pt x="174398" y="4881247"/>
-                    <a:pt x="264206" y="4843127"/>
-                  </a:cubicBezTo>
-                  <a:lnTo>
-                    <a:pt x="577090" y="4710315"/>
-                  </a:lnTo>
-                  <a:lnTo>
-                    <a:pt x="541083" y="4570286"/>
-                  </a:lnTo>
-                  <a:lnTo>
-                    <a:pt x="517049" y="4412805"/>
-                  </a:lnTo>
-                  <a:lnTo>
-                    <a:pt x="176658" y="4412805"/>
-                  </a:lnTo>
-                  <a:cubicBezTo>
-                    <a:pt x="79093" y="4412805"/>
-                    <a:pt x="0" y="4333712"/>
-                    <a:pt x="0" y="4236146"/>
-                  </a:cubicBezTo>
-                  <a:lnTo>
-                    <a:pt x="0" y="3529533"/>
-                  </a:lnTo>
-                  <a:cubicBezTo>
-                    <a:pt x="0" y="3431967"/>
-                    <a:pt x="79093" y="3352874"/>
-                    <a:pt x="176658" y="3352874"/>
-                  </a:cubicBezTo>
-                  <a:lnTo>
-                    <a:pt x="517049" y="3352874"/>
-                  </a:lnTo>
-                  <a:lnTo>
-                    <a:pt x="541083" y="3195391"/>
-                  </a:lnTo>
-                  <a:lnTo>
-                    <a:pt x="577088" y="3055364"/>
-                  </a:lnTo>
-                  <a:lnTo>
-                    <a:pt x="264208" y="2922555"/>
-                  </a:lnTo>
-                  <a:cubicBezTo>
-                    <a:pt x="174398" y="2884432"/>
-                    <a:pt x="132497" y="2780723"/>
-                    <a:pt x="170618" y="2690915"/>
-                  </a:cubicBezTo>
-                  <a:lnTo>
-                    <a:pt x="446715" y="2040474"/>
-                  </a:lnTo>
-                  <a:cubicBezTo>
-                    <a:pt x="484836" y="1950663"/>
-                    <a:pt x="588545" y="1908762"/>
-                    <a:pt x="678356" y="1946884"/>
-                  </a:cubicBezTo>
-                  <a:lnTo>
-                    <a:pt x="991170" y="2079665"/>
-                  </a:lnTo>
-                  <a:lnTo>
-                    <a:pt x="1054338" y="1975686"/>
-                  </a:lnTo>
-                  <a:lnTo>
-                    <a:pt x="1127870" y="1877354"/>
-                  </a:lnTo>
-                  <a:lnTo>
-                    <a:pt x="887432" y="1636916"/>
-                  </a:lnTo>
-                  <a:cubicBezTo>
-                    <a:pt x="818442" y="1567926"/>
-                    <a:pt x="818442" y="1456072"/>
-                    <a:pt x="887432" y="1387083"/>
-                  </a:cubicBezTo>
-                  <a:lnTo>
-                    <a:pt x="1387083" y="887432"/>
-                  </a:lnTo>
-                  <a:cubicBezTo>
-                    <a:pt x="1456073" y="818442"/>
-                    <a:pt x="1567926" y="818442"/>
-                    <a:pt x="1636915" y="887432"/>
-                  </a:cubicBezTo>
-                  <a:lnTo>
-                    <a:pt x="1877353" y="1127870"/>
-                  </a:lnTo>
-                  <a:lnTo>
-                    <a:pt x="1975685" y="1054338"/>
-                  </a:lnTo>
-                  <a:lnTo>
-                    <a:pt x="2079665" y="991168"/>
-                  </a:lnTo>
-                  <a:lnTo>
-                    <a:pt x="1946884" y="678355"/>
-                  </a:lnTo>
-                  <a:cubicBezTo>
-                    <a:pt x="1908761" y="588545"/>
-                    <a:pt x="1950663" y="484838"/>
-                    <a:pt x="2040472" y="446715"/>
-                  </a:cubicBezTo>
-                  <a:lnTo>
-                    <a:pt x="2690915" y="170620"/>
-                  </a:lnTo>
-                  <a:cubicBezTo>
-                    <a:pt x="2780723" y="132497"/>
-                    <a:pt x="2884432" y="174398"/>
-                    <a:pt x="2922555" y="264208"/>
-                  </a:cubicBezTo>
-                  <a:lnTo>
-                    <a:pt x="3055364" y="577088"/>
-                  </a:lnTo>
-                  <a:lnTo>
-                    <a:pt x="3195391" y="541083"/>
-                  </a:lnTo>
-                  <a:lnTo>
-                    <a:pt x="3352874" y="517049"/>
-                  </a:lnTo>
-                  <a:lnTo>
-                    <a:pt x="3352874" y="176658"/>
-                  </a:lnTo>
-                  <a:cubicBezTo>
-                    <a:pt x="3352874" y="79092"/>
-                    <a:pt x="3431967" y="0"/>
-                    <a:pt x="3529533" y="0"/>
-                  </a:cubicBezTo>
-                  <a:close/>
-                </a:path>
-              </a:pathLst>
-            </a:custGeom>
-            <a:gradFill flip="none" rotWithShape="1">
-              <a:gsLst>
-                <a:gs pos="0">
-                  <a:srgbClr val="330066"/>
-                </a:gs>
-                <a:gs pos="100000">
-                  <a:srgbClr val="330066"/>
-                </a:gs>
-                <a:gs pos="43000">
-                  <a:srgbClr val="660099"/>
-                </a:gs>
-                <a:gs pos="48000">
-                  <a:srgbClr val="660099"/>
-                </a:gs>
-              </a:gsLst>
-              <a:lin ang="0" scaled="1"/>
-              <a:tileRect/>
-            </a:gradFill>
-            <a:ln w="190500">
-              <a:noFill/>
-            </a:ln>
-            <a:effectLst/>
-          </p:spPr>
-          <p:style>
-            <a:lnRef idx="1">
-              <a:schemeClr val="accent1"/>
-            </a:lnRef>
-            <a:fillRef idx="3">
-              <a:schemeClr val="accent1"/>
-            </a:fillRef>
-            <a:effectRef idx="2">
-              <a:schemeClr val="accent1"/>
-            </a:effectRef>
-            <a:fontRef idx="minor">
-              <a:schemeClr val="lt1"/>
-            </a:fontRef>
-          </p:style>
-          <p:txBody>
-            <a:bodyPr rot="0" spcFirstLastPara="0" vertOverflow="overflow" horzOverflow="overflow" vert="horz" wrap="square" lIns="91440" tIns="45720" rIns="91440" bIns="45720" numCol="1" spcCol="0" rtlCol="0" fromWordArt="0" anchor="ctr" anchorCtr="0" forceAA="0" compatLnSpc="1">
-              <a:prstTxWarp prst="textNoShape">
-                <a:avLst/>
-              </a:prstTxWarp>
-              <a:noAutofit/>
-            </a:bodyPr>
-            <a:lstStyle/>
-            <a:p>
-              <a:pPr algn="ctr"/>
-              <a:endParaRPr lang="en-US"/>
-            </a:p>
-          </p:txBody>
-        </p:sp>
-        <p:sp>
-          <p:nvSpPr>
-            <p:cNvPr id="3" name="TextBox 2"/>
-            <p:cNvSpPr txBox="1"/>
-            <p:nvPr/>
-          </p:nvSpPr>
-          <p:spPr>
-            <a:xfrm>
-              <a:off x="4006311" y="1954703"/>
-              <a:ext cx="6152827" cy="1323439"/>
-            </a:xfrm>
-            <a:prstGeom prst="rect">
-              <a:avLst/>
-            </a:prstGeom>
-            <a:noFill/>
-          </p:spPr>
-          <p:txBody>
-            <a:bodyPr wrap="square" rtlCol="0">
-              <a:spAutoFit/>
-            </a:bodyPr>
-            <a:lstStyle/>
-            <a:p>
-              <a:r>
-                <a:rPr lang="en-US" sz="8000" dirty="0" smtClean="0">
-                  <a:solidFill>
-                    <a:srgbClr val="430084"/>
-                  </a:solidFill>
-                </a:rPr>
-                <a:t>Human-SE Lab</a:t>
-              </a:r>
-              <a:endParaRPr lang="en-US" sz="8000" dirty="0">
-                <a:solidFill>
-                  <a:srgbClr val="430084"/>
-                </a:solidFill>
-              </a:endParaRPr>
-            </a:p>
-          </p:txBody>
-        </p:sp>
-      </p:grpSp>
-    </p:spTree>
-    <p:extLst>
-      <p:ext uri="{BB962C8B-B14F-4D97-AF65-F5344CB8AC3E}">
-        <p14:creationId xmlns:p14="http://schemas.microsoft.com/office/powerpoint/2010/main" val="4001461138"/>
-      </p:ext>
-    </p:extLst>
-  </p:cSld>
-  <p:clrMapOvr>
-    <a:masterClrMapping/>
-  </p:clrMapOvr>
-  <p:timing>
-    <p:tnLst>
-      <p:par>
-        <p:cTn id="1" dur="indefinite" restart="never" nodeType="tmRoot"/>
-      </p:par>
-    </p:tnLst>
-  </p:timing>
-</p:sld>
-</file>
-
 <file path=ppt/theme/theme1.xml><?xml version="1.0" encoding="utf-8"?>
 <a:theme xmlns:a="http://schemas.openxmlformats.org/drawingml/2006/main" name="Office Theme">
   <a:themeElements>
@@ -4543,7 +3842,7 @@
   <a:extraClrSchemeLst/>
   <a:extLst>
     <a:ext uri="{05A4C25C-085E-4340-85A3-A5531E510DB2}">
-      <thm15:themeFamily xmlns:thm15="http://schemas.microsoft.com/office/thememl/2012/main" xmlns="" name="Office Theme" id="{62F939B6-93AF-4DB8-9C6B-D6C7DFDC589F}" vid="{4A3C46E8-61CC-4603-A589-7422A47A8E4A}"/>
+      <thm15:themeFamily xmlns:thm15="http://schemas.microsoft.com/office/thememl/2012/main" name="Office Theme" id="{62F939B6-93AF-4DB8-9C6B-D6C7DFDC589F}" vid="{4A3C46E8-61CC-4603-A589-7422A47A8E4A}"/>
     </a:ext>
   </a:extLst>
 </a:theme>

</xml_diff>